<commit_message>
Cambios a las descripciones
</commit_message>
<xml_diff>
--- a/Documentos/Presentaciones/Temario Farmacia.pptx
+++ b/Documentos/Presentaciones/Temario Farmacia.pptx
@@ -261,7 +261,7 @@
           <a:p>
             <a:fld id="{D07697AA-50AD-46BD-8A7A-EAA3C7C96305}" type="datetimeFigureOut">
               <a:rPr lang="es-MX" smtClean="0"/>
-              <a:t>07/06/2020</a:t>
+              <a:t>09/06/2020</a:t>
             </a:fld>
             <a:endParaRPr lang="es-MX"/>
           </a:p>
@@ -461,7 +461,7 @@
           <a:p>
             <a:fld id="{D07697AA-50AD-46BD-8A7A-EAA3C7C96305}" type="datetimeFigureOut">
               <a:rPr lang="es-MX" smtClean="0"/>
-              <a:t>07/06/2020</a:t>
+              <a:t>09/06/2020</a:t>
             </a:fld>
             <a:endParaRPr lang="es-MX"/>
           </a:p>
@@ -671,7 +671,7 @@
           <a:p>
             <a:fld id="{D07697AA-50AD-46BD-8A7A-EAA3C7C96305}" type="datetimeFigureOut">
               <a:rPr lang="es-MX" smtClean="0"/>
-              <a:t>07/06/2020</a:t>
+              <a:t>09/06/2020</a:t>
             </a:fld>
             <a:endParaRPr lang="es-MX"/>
           </a:p>
@@ -871,7 +871,7 @@
           <a:p>
             <a:fld id="{D07697AA-50AD-46BD-8A7A-EAA3C7C96305}" type="datetimeFigureOut">
               <a:rPr lang="es-MX" smtClean="0"/>
-              <a:t>07/06/2020</a:t>
+              <a:t>09/06/2020</a:t>
             </a:fld>
             <a:endParaRPr lang="es-MX"/>
           </a:p>
@@ -1147,7 +1147,7 @@
           <a:p>
             <a:fld id="{D07697AA-50AD-46BD-8A7A-EAA3C7C96305}" type="datetimeFigureOut">
               <a:rPr lang="es-MX" smtClean="0"/>
-              <a:t>07/06/2020</a:t>
+              <a:t>09/06/2020</a:t>
             </a:fld>
             <a:endParaRPr lang="es-MX"/>
           </a:p>
@@ -1415,7 +1415,7 @@
           <a:p>
             <a:fld id="{D07697AA-50AD-46BD-8A7A-EAA3C7C96305}" type="datetimeFigureOut">
               <a:rPr lang="es-MX" smtClean="0"/>
-              <a:t>07/06/2020</a:t>
+              <a:t>09/06/2020</a:t>
             </a:fld>
             <a:endParaRPr lang="es-MX"/>
           </a:p>
@@ -1830,7 +1830,7 @@
           <a:p>
             <a:fld id="{D07697AA-50AD-46BD-8A7A-EAA3C7C96305}" type="datetimeFigureOut">
               <a:rPr lang="es-MX" smtClean="0"/>
-              <a:t>07/06/2020</a:t>
+              <a:t>09/06/2020</a:t>
             </a:fld>
             <a:endParaRPr lang="es-MX"/>
           </a:p>
@@ -1972,7 +1972,7 @@
           <a:p>
             <a:fld id="{D07697AA-50AD-46BD-8A7A-EAA3C7C96305}" type="datetimeFigureOut">
               <a:rPr lang="es-MX" smtClean="0"/>
-              <a:t>07/06/2020</a:t>
+              <a:t>09/06/2020</a:t>
             </a:fld>
             <a:endParaRPr lang="es-MX"/>
           </a:p>
@@ -2085,7 +2085,7 @@
           <a:p>
             <a:fld id="{D07697AA-50AD-46BD-8A7A-EAA3C7C96305}" type="datetimeFigureOut">
               <a:rPr lang="es-MX" smtClean="0"/>
-              <a:t>07/06/2020</a:t>
+              <a:t>09/06/2020</a:t>
             </a:fld>
             <a:endParaRPr lang="es-MX"/>
           </a:p>
@@ -2398,7 +2398,7 @@
           <a:p>
             <a:fld id="{D07697AA-50AD-46BD-8A7A-EAA3C7C96305}" type="datetimeFigureOut">
               <a:rPr lang="es-MX" smtClean="0"/>
-              <a:t>07/06/2020</a:t>
+              <a:t>09/06/2020</a:t>
             </a:fld>
             <a:endParaRPr lang="es-MX"/>
           </a:p>
@@ -2687,7 +2687,7 @@
           <a:p>
             <a:fld id="{D07697AA-50AD-46BD-8A7A-EAA3C7C96305}" type="datetimeFigureOut">
               <a:rPr lang="es-MX" smtClean="0"/>
-              <a:t>07/06/2020</a:t>
+              <a:t>09/06/2020</a:t>
             </a:fld>
             <a:endParaRPr lang="es-MX"/>
           </a:p>
@@ -2939,7 +2939,7 @@
           <a:p>
             <a:fld id="{D07697AA-50AD-46BD-8A7A-EAA3C7C96305}" type="datetimeFigureOut">
               <a:rPr lang="es-MX" smtClean="0"/>
-              <a:t>07/06/2020</a:t>
+              <a:t>09/06/2020</a:t>
             </a:fld>
             <a:endParaRPr lang="es-MX"/>
           </a:p>
@@ -3589,7 +3589,7 @@
           <a:noFill/>
         </p:spPr>
         <p:txBody>
-          <a:bodyPr wrap="square" numCol="2" rtlCol="0">
+          <a:bodyPr wrap="square" numCol="2" spcCol="360000" rtlCol="0">
             <a:spAutoFit/>
           </a:bodyPr>
           <a:lstStyle/>
@@ -3938,6 +3938,476 @@
             <a:endParaRPr lang="es-MX" sz="2400" dirty="0">
               <a:latin typeface="Berlin Sans FB" panose="020E0602020502020306" pitchFamily="34" charset="0"/>
             </a:endParaRPr>
+          </a:p>
+        </p:txBody>
+      </p:sp>
+      <p:sp>
+        <p:nvSpPr>
+          <p:cNvPr id="8" name="Rectángulo: esquinas redondeadas 7">
+            <a:extLst>
+              <a:ext uri="{FF2B5EF4-FFF2-40B4-BE49-F238E27FC236}">
+                <a16:creationId xmlns:a16="http://schemas.microsoft.com/office/drawing/2014/main" id="{DB2C91CB-C56E-4A3E-93BA-AE6EFA6561F4}"/>
+              </a:ext>
+            </a:extLst>
+          </p:cNvPr>
+          <p:cNvSpPr/>
+          <p:nvPr/>
+        </p:nvSpPr>
+        <p:spPr>
+          <a:xfrm>
+            <a:off x="5625447" y="2565546"/>
+            <a:ext cx="252840" cy="235984"/>
+          </a:xfrm>
+          <a:prstGeom prst="roundRect">
+            <a:avLst/>
+          </a:prstGeom>
+        </p:spPr>
+        <p:style>
+          <a:lnRef idx="0">
+            <a:schemeClr val="accent1"/>
+          </a:lnRef>
+          <a:fillRef idx="3">
+            <a:schemeClr val="accent1"/>
+          </a:fillRef>
+          <a:effectRef idx="3">
+            <a:schemeClr val="accent1"/>
+          </a:effectRef>
+          <a:fontRef idx="minor">
+            <a:schemeClr val="lt1"/>
+          </a:fontRef>
+        </p:style>
+        <p:txBody>
+          <a:bodyPr rtlCol="0" anchor="ctr"/>
+          <a:lstStyle/>
+          <a:p>
+            <a:pPr algn="ctr"/>
+            <a:r>
+              <a:rPr lang="es-MX" sz="1400" dirty="0"/>
+              <a:t>R</a:t>
+            </a:r>
+          </a:p>
+        </p:txBody>
+      </p:sp>
+      <p:sp>
+        <p:nvSpPr>
+          <p:cNvPr id="10" name="Rectángulo: esquinas redondeadas 9">
+            <a:extLst>
+              <a:ext uri="{FF2B5EF4-FFF2-40B4-BE49-F238E27FC236}">
+                <a16:creationId xmlns:a16="http://schemas.microsoft.com/office/drawing/2014/main" id="{9F7228EE-7430-4234-973E-D33126FB98EA}"/>
+              </a:ext>
+            </a:extLst>
+          </p:cNvPr>
+          <p:cNvSpPr/>
+          <p:nvPr/>
+        </p:nvSpPr>
+        <p:spPr>
+          <a:xfrm>
+            <a:off x="5625447" y="6197021"/>
+            <a:ext cx="252840" cy="235984"/>
+          </a:xfrm>
+          <a:prstGeom prst="roundRect">
+            <a:avLst/>
+          </a:prstGeom>
+        </p:spPr>
+        <p:style>
+          <a:lnRef idx="0">
+            <a:schemeClr val="accent1"/>
+          </a:lnRef>
+          <a:fillRef idx="3">
+            <a:schemeClr val="accent1"/>
+          </a:fillRef>
+          <a:effectRef idx="3">
+            <a:schemeClr val="accent1"/>
+          </a:effectRef>
+          <a:fontRef idx="minor">
+            <a:schemeClr val="lt1"/>
+          </a:fontRef>
+        </p:style>
+        <p:txBody>
+          <a:bodyPr rtlCol="0" anchor="ctr"/>
+          <a:lstStyle/>
+          <a:p>
+            <a:pPr algn="ctr"/>
+            <a:r>
+              <a:rPr lang="es-MX" sz="1400" dirty="0"/>
+              <a:t>R</a:t>
+            </a:r>
+          </a:p>
+        </p:txBody>
+      </p:sp>
+      <p:sp>
+        <p:nvSpPr>
+          <p:cNvPr id="11" name="Rectángulo: esquinas redondeadas 10">
+            <a:extLst>
+              <a:ext uri="{FF2B5EF4-FFF2-40B4-BE49-F238E27FC236}">
+                <a16:creationId xmlns:a16="http://schemas.microsoft.com/office/drawing/2014/main" id="{17E75066-F5E9-4A42-B1F3-1418DE89F0C8}"/>
+              </a:ext>
+            </a:extLst>
+          </p:cNvPr>
+          <p:cNvSpPr/>
+          <p:nvPr/>
+        </p:nvSpPr>
+        <p:spPr>
+          <a:xfrm>
+            <a:off x="10955093" y="3311008"/>
+            <a:ext cx="252840" cy="235984"/>
+          </a:xfrm>
+          <a:prstGeom prst="roundRect">
+            <a:avLst/>
+          </a:prstGeom>
+        </p:spPr>
+        <p:style>
+          <a:lnRef idx="0">
+            <a:schemeClr val="accent1"/>
+          </a:lnRef>
+          <a:fillRef idx="3">
+            <a:schemeClr val="accent1"/>
+          </a:fillRef>
+          <a:effectRef idx="3">
+            <a:schemeClr val="accent1"/>
+          </a:effectRef>
+          <a:fontRef idx="minor">
+            <a:schemeClr val="lt1"/>
+          </a:fontRef>
+        </p:style>
+        <p:txBody>
+          <a:bodyPr rtlCol="0" anchor="ctr"/>
+          <a:lstStyle/>
+          <a:p>
+            <a:pPr algn="ctr"/>
+            <a:r>
+              <a:rPr lang="es-MX" sz="1400" dirty="0"/>
+              <a:t>R</a:t>
+            </a:r>
+          </a:p>
+        </p:txBody>
+      </p:sp>
+      <p:sp>
+        <p:nvSpPr>
+          <p:cNvPr id="12" name="Rectángulo: esquinas redondeadas 11">
+            <a:extLst>
+              <a:ext uri="{FF2B5EF4-FFF2-40B4-BE49-F238E27FC236}">
+                <a16:creationId xmlns:a16="http://schemas.microsoft.com/office/drawing/2014/main" id="{CB6AF9AF-8B4A-45F9-B91E-4953ADD31621}"/>
+              </a:ext>
+            </a:extLst>
+          </p:cNvPr>
+          <p:cNvSpPr/>
+          <p:nvPr/>
+        </p:nvSpPr>
+        <p:spPr>
+          <a:xfrm>
+            <a:off x="10955093" y="3660087"/>
+            <a:ext cx="252840" cy="235984"/>
+          </a:xfrm>
+          <a:prstGeom prst="roundRect">
+            <a:avLst/>
+          </a:prstGeom>
+        </p:spPr>
+        <p:style>
+          <a:lnRef idx="0">
+            <a:schemeClr val="accent1"/>
+          </a:lnRef>
+          <a:fillRef idx="3">
+            <a:schemeClr val="accent1"/>
+          </a:fillRef>
+          <a:effectRef idx="3">
+            <a:schemeClr val="accent1"/>
+          </a:effectRef>
+          <a:fontRef idx="minor">
+            <a:schemeClr val="lt1"/>
+          </a:fontRef>
+        </p:style>
+        <p:txBody>
+          <a:bodyPr rtlCol="0" anchor="ctr"/>
+          <a:lstStyle/>
+          <a:p>
+            <a:pPr algn="ctr"/>
+            <a:r>
+              <a:rPr lang="es-MX" sz="1400" dirty="0"/>
+              <a:t>R</a:t>
+            </a:r>
+          </a:p>
+        </p:txBody>
+      </p:sp>
+      <p:sp>
+        <p:nvSpPr>
+          <p:cNvPr id="13" name="Rectángulo: esquinas redondeadas 12">
+            <a:extLst>
+              <a:ext uri="{FF2B5EF4-FFF2-40B4-BE49-F238E27FC236}">
+                <a16:creationId xmlns:a16="http://schemas.microsoft.com/office/drawing/2014/main" id="{BD8F9477-0524-4794-AC4E-41B1A019E0AB}"/>
+              </a:ext>
+            </a:extLst>
+          </p:cNvPr>
+          <p:cNvSpPr/>
+          <p:nvPr/>
+        </p:nvSpPr>
+        <p:spPr>
+          <a:xfrm>
+            <a:off x="10955093" y="4054133"/>
+            <a:ext cx="252840" cy="235984"/>
+          </a:xfrm>
+          <a:prstGeom prst="roundRect">
+            <a:avLst/>
+          </a:prstGeom>
+        </p:spPr>
+        <p:style>
+          <a:lnRef idx="0">
+            <a:schemeClr val="accent1"/>
+          </a:lnRef>
+          <a:fillRef idx="3">
+            <a:schemeClr val="accent1"/>
+          </a:fillRef>
+          <a:effectRef idx="3">
+            <a:schemeClr val="accent1"/>
+          </a:effectRef>
+          <a:fontRef idx="minor">
+            <a:schemeClr val="lt1"/>
+          </a:fontRef>
+        </p:style>
+        <p:txBody>
+          <a:bodyPr rtlCol="0" anchor="ctr"/>
+          <a:lstStyle/>
+          <a:p>
+            <a:pPr algn="ctr"/>
+            <a:r>
+              <a:rPr lang="es-MX" sz="1400" dirty="0"/>
+              <a:t>R</a:t>
+            </a:r>
+          </a:p>
+        </p:txBody>
+      </p:sp>
+      <p:sp>
+        <p:nvSpPr>
+          <p:cNvPr id="14" name="Rectángulo: esquinas redondeadas 13">
+            <a:extLst>
+              <a:ext uri="{FF2B5EF4-FFF2-40B4-BE49-F238E27FC236}">
+                <a16:creationId xmlns:a16="http://schemas.microsoft.com/office/drawing/2014/main" id="{EF28FEF3-A703-4347-87DD-E8D8E8C15409}"/>
+              </a:ext>
+            </a:extLst>
+          </p:cNvPr>
+          <p:cNvSpPr/>
+          <p:nvPr/>
+        </p:nvSpPr>
+        <p:spPr>
+          <a:xfrm>
+            <a:off x="10955093" y="4390149"/>
+            <a:ext cx="252840" cy="235984"/>
+          </a:xfrm>
+          <a:prstGeom prst="roundRect">
+            <a:avLst/>
+          </a:prstGeom>
+        </p:spPr>
+        <p:style>
+          <a:lnRef idx="0">
+            <a:schemeClr val="accent1"/>
+          </a:lnRef>
+          <a:fillRef idx="3">
+            <a:schemeClr val="accent1"/>
+          </a:fillRef>
+          <a:effectRef idx="3">
+            <a:schemeClr val="accent1"/>
+          </a:effectRef>
+          <a:fontRef idx="minor">
+            <a:schemeClr val="lt1"/>
+          </a:fontRef>
+        </p:style>
+        <p:txBody>
+          <a:bodyPr rtlCol="0" anchor="ctr"/>
+          <a:lstStyle/>
+          <a:p>
+            <a:pPr algn="ctr"/>
+            <a:r>
+              <a:rPr lang="es-MX" sz="1400" dirty="0"/>
+              <a:t>R</a:t>
+            </a:r>
+          </a:p>
+        </p:txBody>
+      </p:sp>
+      <p:sp>
+        <p:nvSpPr>
+          <p:cNvPr id="15" name="Rectángulo: esquinas redondeadas 14">
+            <a:extLst>
+              <a:ext uri="{FF2B5EF4-FFF2-40B4-BE49-F238E27FC236}">
+                <a16:creationId xmlns:a16="http://schemas.microsoft.com/office/drawing/2014/main" id="{D7235262-A9AB-471B-8033-1F8CED2A16B0}"/>
+              </a:ext>
+            </a:extLst>
+          </p:cNvPr>
+          <p:cNvSpPr/>
+          <p:nvPr/>
+        </p:nvSpPr>
+        <p:spPr>
+          <a:xfrm>
+            <a:off x="10955093" y="4763484"/>
+            <a:ext cx="252840" cy="235984"/>
+          </a:xfrm>
+          <a:prstGeom prst="roundRect">
+            <a:avLst/>
+          </a:prstGeom>
+        </p:spPr>
+        <p:style>
+          <a:lnRef idx="0">
+            <a:schemeClr val="accent1"/>
+          </a:lnRef>
+          <a:fillRef idx="3">
+            <a:schemeClr val="accent1"/>
+          </a:fillRef>
+          <a:effectRef idx="3">
+            <a:schemeClr val="accent1"/>
+          </a:effectRef>
+          <a:fontRef idx="minor">
+            <a:schemeClr val="lt1"/>
+          </a:fontRef>
+        </p:style>
+        <p:txBody>
+          <a:bodyPr rtlCol="0" anchor="ctr"/>
+          <a:lstStyle/>
+          <a:p>
+            <a:pPr algn="ctr"/>
+            <a:r>
+              <a:rPr lang="es-MX" sz="1400" dirty="0"/>
+              <a:t>R</a:t>
+            </a:r>
+          </a:p>
+        </p:txBody>
+      </p:sp>
+      <p:sp>
+        <p:nvSpPr>
+          <p:cNvPr id="16" name="Rectángulo: esquinas redondeadas 15">
+            <a:extLst>
+              <a:ext uri="{FF2B5EF4-FFF2-40B4-BE49-F238E27FC236}">
+                <a16:creationId xmlns:a16="http://schemas.microsoft.com/office/drawing/2014/main" id="{4D598029-F8DC-4780-8734-66C1AF2ABFE4}"/>
+              </a:ext>
+            </a:extLst>
+          </p:cNvPr>
+          <p:cNvSpPr/>
+          <p:nvPr/>
+        </p:nvSpPr>
+        <p:spPr>
+          <a:xfrm>
+            <a:off x="10955093" y="5125624"/>
+            <a:ext cx="252840" cy="235984"/>
+          </a:xfrm>
+          <a:prstGeom prst="roundRect">
+            <a:avLst/>
+          </a:prstGeom>
+        </p:spPr>
+        <p:style>
+          <a:lnRef idx="0">
+            <a:schemeClr val="accent1"/>
+          </a:lnRef>
+          <a:fillRef idx="3">
+            <a:schemeClr val="accent1"/>
+          </a:fillRef>
+          <a:effectRef idx="3">
+            <a:schemeClr val="accent1"/>
+          </a:effectRef>
+          <a:fontRef idx="minor">
+            <a:schemeClr val="lt1"/>
+          </a:fontRef>
+        </p:style>
+        <p:txBody>
+          <a:bodyPr rtlCol="0" anchor="ctr"/>
+          <a:lstStyle/>
+          <a:p>
+            <a:pPr algn="ctr"/>
+            <a:r>
+              <a:rPr lang="es-MX" sz="1400" dirty="0"/>
+              <a:t>R</a:t>
+            </a:r>
+          </a:p>
+        </p:txBody>
+      </p:sp>
+      <p:sp>
+        <p:nvSpPr>
+          <p:cNvPr id="17" name="Rectángulo: esquinas redondeadas 16">
+            <a:extLst>
+              <a:ext uri="{FF2B5EF4-FFF2-40B4-BE49-F238E27FC236}">
+                <a16:creationId xmlns:a16="http://schemas.microsoft.com/office/drawing/2014/main" id="{03374F89-FCD2-475B-AF8B-0D6F3E24E53C}"/>
+              </a:ext>
+            </a:extLst>
+          </p:cNvPr>
+          <p:cNvSpPr/>
+          <p:nvPr/>
+        </p:nvSpPr>
+        <p:spPr>
+          <a:xfrm>
+            <a:off x="10955093" y="5493543"/>
+            <a:ext cx="252840" cy="235984"/>
+          </a:xfrm>
+          <a:prstGeom prst="roundRect">
+            <a:avLst/>
+          </a:prstGeom>
+        </p:spPr>
+        <p:style>
+          <a:lnRef idx="0">
+            <a:schemeClr val="accent1"/>
+          </a:lnRef>
+          <a:fillRef idx="3">
+            <a:schemeClr val="accent1"/>
+          </a:fillRef>
+          <a:effectRef idx="3">
+            <a:schemeClr val="accent1"/>
+          </a:effectRef>
+          <a:fontRef idx="minor">
+            <a:schemeClr val="lt1"/>
+          </a:fontRef>
+        </p:style>
+        <p:txBody>
+          <a:bodyPr rtlCol="0" anchor="ctr"/>
+          <a:lstStyle/>
+          <a:p>
+            <a:pPr algn="ctr"/>
+            <a:r>
+              <a:rPr lang="es-MX" sz="1400" dirty="0"/>
+              <a:t>R</a:t>
+            </a:r>
+          </a:p>
+        </p:txBody>
+      </p:sp>
+      <p:sp>
+        <p:nvSpPr>
+          <p:cNvPr id="18" name="Rectángulo: esquinas redondeadas 17">
+            <a:extLst>
+              <a:ext uri="{FF2B5EF4-FFF2-40B4-BE49-F238E27FC236}">
+                <a16:creationId xmlns:a16="http://schemas.microsoft.com/office/drawing/2014/main" id="{BB0459D7-6E94-40D4-9730-17A2C253AEBE}"/>
+              </a:ext>
+            </a:extLst>
+          </p:cNvPr>
+          <p:cNvSpPr/>
+          <p:nvPr/>
+        </p:nvSpPr>
+        <p:spPr>
+          <a:xfrm>
+            <a:off x="10955093" y="5855688"/>
+            <a:ext cx="252840" cy="235984"/>
+          </a:xfrm>
+          <a:prstGeom prst="roundRect">
+            <a:avLst/>
+          </a:prstGeom>
+        </p:spPr>
+        <p:style>
+          <a:lnRef idx="0">
+            <a:schemeClr val="accent1"/>
+          </a:lnRef>
+          <a:fillRef idx="3">
+            <a:schemeClr val="accent1"/>
+          </a:fillRef>
+          <a:effectRef idx="3">
+            <a:schemeClr val="accent1"/>
+          </a:effectRef>
+          <a:fontRef idx="minor">
+            <a:schemeClr val="lt1"/>
+          </a:fontRef>
+        </p:style>
+        <p:txBody>
+          <a:bodyPr rtlCol="0" anchor="ctr"/>
+          <a:lstStyle/>
+          <a:p>
+            <a:pPr algn="ctr"/>
+            <a:r>
+              <a:rPr lang="es-MX" sz="1400" dirty="0"/>
+              <a:t>R</a:t>
+            </a:r>
           </a:p>
         </p:txBody>
       </p:sp>

</xml_diff>